<commit_message>
Update Plantilla General 2020.pptx
</commit_message>
<xml_diff>
--- a/Plantilla General 2020.pptx
+++ b/Plantilla General 2020.pptx
@@ -3861,7 +3861,7 @@
           <a:p>
             <a:fld id="{3A7985F4-B8CC-48A5-B619-C986ABA454E5}" type="datetimeFigureOut">
               <a:rPr lang="es-PE" smtClean="0"/>
-              <a:t>8/07/2020</a:t>
+              <a:t>09/07/2020</a:t>
             </a:fld>
             <a:endParaRPr lang="es-PE"/>
           </a:p>
@@ -5722,7 +5722,7 @@
           <a:p>
             <a:fld id="{84DE248C-07F7-42E3-8283-42E2516C9C01}" type="datetimeFigureOut">
               <a:rPr lang="es-PE" smtClean="0"/>
-              <a:t>8/07/2020</a:t>
+              <a:t>09/07/2020</a:t>
             </a:fld>
             <a:endParaRPr lang="es-PE"/>
           </a:p>
@@ -5930,7 +5930,7 @@
           <a:p>
             <a:fld id="{84DE248C-07F7-42E3-8283-42E2516C9C01}" type="datetimeFigureOut">
               <a:rPr lang="es-PE" smtClean="0"/>
-              <a:t>8/07/2020</a:t>
+              <a:t>09/07/2020</a:t>
             </a:fld>
             <a:endParaRPr lang="es-PE"/>
           </a:p>
@@ -6186,7 +6186,7 @@
           <a:p>
             <a:fld id="{84DE248C-07F7-42E3-8283-42E2516C9C01}" type="datetimeFigureOut">
               <a:rPr lang="es-PE" smtClean="0"/>
-              <a:t>8/07/2020</a:t>
+              <a:t>09/07/2020</a:t>
             </a:fld>
             <a:endParaRPr lang="es-PE"/>
           </a:p>
@@ -7650,7 +7650,7 @@
           <a:p>
             <a:fld id="{84DE248C-07F7-42E3-8283-42E2516C9C01}" type="datetimeFigureOut">
               <a:rPr lang="es-PE" smtClean="0"/>
-              <a:t>8/07/2020</a:t>
+              <a:t>09/07/2020</a:t>
             </a:fld>
             <a:endParaRPr lang="es-PE"/>
           </a:p>
@@ -7993,7 +7993,7 @@
           <a:p>
             <a:fld id="{84DE248C-07F7-42E3-8283-42E2516C9C01}" type="datetimeFigureOut">
               <a:rPr lang="es-PE" smtClean="0"/>
-              <a:t>8/07/2020</a:t>
+              <a:t>09/07/2020</a:t>
             </a:fld>
             <a:endParaRPr lang="es-PE"/>
           </a:p>
@@ -8268,7 +8268,7 @@
           <a:p>
             <a:fld id="{84DE248C-07F7-42E3-8283-42E2516C9C01}" type="datetimeFigureOut">
               <a:rPr lang="es-PE" smtClean="0"/>
-              <a:t>8/07/2020</a:t>
+              <a:t>09/07/2020</a:t>
             </a:fld>
             <a:endParaRPr lang="es-PE"/>
           </a:p>
@@ -8647,7 +8647,7 @@
           <a:p>
             <a:fld id="{84DE248C-07F7-42E3-8283-42E2516C9C01}" type="datetimeFigureOut">
               <a:rPr lang="es-PE" smtClean="0"/>
-              <a:t>8/07/2020</a:t>
+              <a:t>09/07/2020</a:t>
             </a:fld>
             <a:endParaRPr lang="es-PE"/>
           </a:p>
@@ -8765,7 +8765,7 @@
           <a:p>
             <a:fld id="{84DE248C-07F7-42E3-8283-42E2516C9C01}" type="datetimeFigureOut">
               <a:rPr lang="es-PE" smtClean="0"/>
-              <a:t>8/07/2020</a:t>
+              <a:t>09/07/2020</a:t>
             </a:fld>
             <a:endParaRPr lang="es-PE"/>
           </a:p>
@@ -8936,7 +8936,7 @@
           <a:p>
             <a:fld id="{84DE248C-07F7-42E3-8283-42E2516C9C01}" type="datetimeFigureOut">
               <a:rPr lang="es-PE" smtClean="0"/>
-              <a:t>8/07/2020</a:t>
+              <a:t>09/07/2020</a:t>
             </a:fld>
             <a:endParaRPr lang="es-PE"/>
           </a:p>
@@ -9290,7 +9290,7 @@
           <a:p>
             <a:fld id="{84DE248C-07F7-42E3-8283-42E2516C9C01}" type="datetimeFigureOut">
               <a:rPr lang="es-PE" smtClean="0"/>
-              <a:t>8/07/2020</a:t>
+              <a:t>09/07/2020</a:t>
             </a:fld>
             <a:endParaRPr lang="es-PE"/>
           </a:p>
@@ -9672,7 +9672,7 @@
           <a:p>
             <a:fld id="{84DE248C-07F7-42E3-8283-42E2516C9C01}" type="datetimeFigureOut">
               <a:rPr lang="es-PE" smtClean="0"/>
-              <a:t>8/07/2020</a:t>
+              <a:t>09/07/2020</a:t>
             </a:fld>
             <a:endParaRPr lang="es-PE"/>
           </a:p>
@@ -9959,7 +9959,7 @@
           <a:p>
             <a:fld id="{84DE248C-07F7-42E3-8283-42E2516C9C01}" type="datetimeFigureOut">
               <a:rPr lang="es-PE" smtClean="0"/>
-              <a:t>8/07/2020</a:t>
+              <a:t>09/07/2020</a:t>
             </a:fld>
             <a:endParaRPr lang="es-PE"/>
           </a:p>
@@ -10504,7 +10504,7 @@
         </p:nvSpPr>
         <p:spPr>
           <a:xfrm>
-            <a:off x="1097280" y="5225749"/>
+            <a:off x="632331" y="5225749"/>
             <a:ext cx="10113264" cy="822960"/>
           </a:xfrm>
         </p:spPr>
@@ -10538,7 +10538,7 @@
         </p:nvSpPr>
         <p:spPr>
           <a:xfrm>
-            <a:off x="5471002" y="5879695"/>
+            <a:off x="5338870" y="5771207"/>
             <a:ext cx="1514259" cy="822960"/>
           </a:xfrm>
         </p:spPr>
@@ -12804,13 +12804,13 @@
   <p:clrMapOvr>
     <a:masterClrMapping/>
   </p:clrMapOvr>
-  <mc:AlternateContent xmlns:mc="http://schemas.openxmlformats.org/markup-compatibility/2006">
-    <mc:Choice xmlns:p15="http://schemas.microsoft.com/office/powerpoint/2012/main" Requires="p15">
+  <mc:AlternateContent xmlns:mc="http://schemas.openxmlformats.org/markup-compatibility/2006" xmlns:p15="http://schemas.microsoft.com/office/powerpoint/2012/main">
+    <mc:Choice Requires="p15">
       <p:transition xmlns:p14="http://schemas.microsoft.com/office/powerpoint/2010/main" spd="slow" p14:dur="2000">
         <p15:prstTrans prst="prestige"/>
       </p:transition>
     </mc:Choice>
-    <mc:Fallback>
+    <mc:Fallback xmlns="">
       <p:transition spd="slow">
         <p:fade/>
       </p:transition>
@@ -13880,13 +13880,13 @@
   <p:clrMapOvr>
     <a:masterClrMapping/>
   </p:clrMapOvr>
-  <mc:AlternateContent xmlns:mc="http://schemas.openxmlformats.org/markup-compatibility/2006">
-    <mc:Choice xmlns:p15="http://schemas.microsoft.com/office/powerpoint/2012/main" Requires="p15">
+  <mc:AlternateContent xmlns:mc="http://schemas.openxmlformats.org/markup-compatibility/2006" xmlns:p15="http://schemas.microsoft.com/office/powerpoint/2012/main">
+    <mc:Choice Requires="p15">
       <p:transition xmlns:p14="http://schemas.microsoft.com/office/powerpoint/2010/main" spd="slow" p14:dur="2000">
         <p15:prstTrans prst="prestige"/>
       </p:transition>
     </mc:Choice>
-    <mc:Fallback>
+    <mc:Fallback xmlns="">
       <p:transition spd="slow">
         <p:fade/>
       </p:transition>
@@ -14964,13 +14964,13 @@
   <p:clrMapOvr>
     <a:masterClrMapping/>
   </p:clrMapOvr>
-  <mc:AlternateContent xmlns:mc="http://schemas.openxmlformats.org/markup-compatibility/2006">
-    <mc:Choice xmlns:p15="http://schemas.microsoft.com/office/powerpoint/2012/main" Requires="p15">
+  <mc:AlternateContent xmlns:mc="http://schemas.openxmlformats.org/markup-compatibility/2006" xmlns:p15="http://schemas.microsoft.com/office/powerpoint/2012/main">
+    <mc:Choice Requires="p15">
       <p:transition xmlns:p14="http://schemas.microsoft.com/office/powerpoint/2010/main" spd="slow" p14:dur="2000">
         <p15:prstTrans prst="prestige"/>
       </p:transition>
     </mc:Choice>
-    <mc:Fallback>
+    <mc:Fallback xmlns="">
       <p:transition spd="slow">
         <p:fade/>
       </p:transition>
@@ -16041,13 +16041,13 @@
   <p:clrMapOvr>
     <a:masterClrMapping/>
   </p:clrMapOvr>
-  <mc:AlternateContent xmlns:mc="http://schemas.openxmlformats.org/markup-compatibility/2006">
-    <mc:Choice xmlns:p15="http://schemas.microsoft.com/office/powerpoint/2012/main" Requires="p15">
+  <mc:AlternateContent xmlns:mc="http://schemas.openxmlformats.org/markup-compatibility/2006" xmlns:p15="http://schemas.microsoft.com/office/powerpoint/2012/main">
+    <mc:Choice Requires="p15">
       <p:transition xmlns:p14="http://schemas.microsoft.com/office/powerpoint/2010/main" spd="slow" p14:dur="2000">
         <p15:prstTrans prst="prestige"/>
       </p:transition>
     </mc:Choice>
-    <mc:Fallback>
+    <mc:Fallback xmlns="">
       <p:transition spd="slow">
         <p:fade/>
       </p:transition>
@@ -16806,13 +16806,13 @@
   <p:clrMapOvr>
     <a:masterClrMapping/>
   </p:clrMapOvr>
-  <mc:AlternateContent xmlns:mc="http://schemas.openxmlformats.org/markup-compatibility/2006">
-    <mc:Choice xmlns:p15="http://schemas.microsoft.com/office/powerpoint/2012/main" Requires="p15">
+  <mc:AlternateContent xmlns:mc="http://schemas.openxmlformats.org/markup-compatibility/2006" xmlns:p15="http://schemas.microsoft.com/office/powerpoint/2012/main">
+    <mc:Choice Requires="p15">
       <p:transition xmlns:p14="http://schemas.microsoft.com/office/powerpoint/2010/main" spd="slow" p14:dur="2000">
         <p15:prstTrans prst="prestige"/>
       </p:transition>
     </mc:Choice>
-    <mc:Fallback>
+    <mc:Fallback xmlns="">
       <p:transition spd="slow">
         <p:fade/>
       </p:transition>
@@ -17655,13 +17655,13 @@
   <p:clrMapOvr>
     <a:masterClrMapping/>
   </p:clrMapOvr>
-  <mc:AlternateContent xmlns:mc="http://schemas.openxmlformats.org/markup-compatibility/2006">
-    <mc:Choice xmlns:p15="http://schemas.microsoft.com/office/powerpoint/2012/main" Requires="p15">
+  <mc:AlternateContent xmlns:mc="http://schemas.openxmlformats.org/markup-compatibility/2006" xmlns:p15="http://schemas.microsoft.com/office/powerpoint/2012/main">
+    <mc:Choice Requires="p15">
       <p:transition xmlns:p14="http://schemas.microsoft.com/office/powerpoint/2010/main" spd="slow" p14:dur="2000">
         <p15:prstTrans prst="prestige"/>
       </p:transition>
     </mc:Choice>
-    <mc:Fallback>
+    <mc:Fallback xmlns="">
       <p:transition spd="slow">
         <p:fade/>
       </p:transition>
@@ -20743,13 +20743,13 @@
   <p:clrMapOvr>
     <a:masterClrMapping/>
   </p:clrMapOvr>
-  <mc:AlternateContent xmlns:mc="http://schemas.openxmlformats.org/markup-compatibility/2006">
-    <mc:Choice xmlns:p15="http://schemas.microsoft.com/office/powerpoint/2012/main" Requires="p15">
+  <mc:AlternateContent xmlns:mc="http://schemas.openxmlformats.org/markup-compatibility/2006" xmlns:p15="http://schemas.microsoft.com/office/powerpoint/2012/main">
+    <mc:Choice Requires="p15">
       <p:transition xmlns:p14="http://schemas.microsoft.com/office/powerpoint/2010/main" spd="slow" p14:dur="1250">
         <p15:prstTrans prst="airplane"/>
       </p:transition>
     </mc:Choice>
-    <mc:Fallback>
+    <mc:Fallback xmlns="">
       <p:transition spd="slow">
         <p:fade/>
       </p:transition>
@@ -22581,13 +22581,13 @@
   <p:clrMapOvr>
     <a:masterClrMapping/>
   </p:clrMapOvr>
-  <mc:AlternateContent xmlns:mc="http://schemas.openxmlformats.org/markup-compatibility/2006">
-    <mc:Choice xmlns:p15="http://schemas.microsoft.com/office/powerpoint/2012/main" Requires="p15">
+  <mc:AlternateContent xmlns:mc="http://schemas.openxmlformats.org/markup-compatibility/2006" xmlns:p15="http://schemas.microsoft.com/office/powerpoint/2012/main">
+    <mc:Choice Requires="p15">
       <p:transition xmlns:p14="http://schemas.microsoft.com/office/powerpoint/2010/main" spd="slow" p14:dur="1250">
         <p15:prstTrans prst="airplane"/>
       </p:transition>
     </mc:Choice>
-    <mc:Fallback>
+    <mc:Fallback xmlns="">
       <p:transition spd="slow">
         <p:fade/>
       </p:transition>
@@ -24716,13 +24716,13 @@
   <p:clrMapOvr>
     <a:masterClrMapping/>
   </p:clrMapOvr>
-  <mc:AlternateContent xmlns:mc="http://schemas.openxmlformats.org/markup-compatibility/2006">
-    <mc:Choice xmlns:p15="http://schemas.microsoft.com/office/powerpoint/2012/main" Requires="p15">
+  <mc:AlternateContent xmlns:mc="http://schemas.openxmlformats.org/markup-compatibility/2006" xmlns:p15="http://schemas.microsoft.com/office/powerpoint/2012/main">
+    <mc:Choice Requires="p15">
       <p:transition xmlns:p14="http://schemas.microsoft.com/office/powerpoint/2010/main" spd="slow" p14:dur="1250">
         <p15:prstTrans prst="airplane"/>
       </p:transition>
     </mc:Choice>
-    <mc:Fallback>
+    <mc:Fallback xmlns="">
       <p:transition spd="slow">
         <p:fade/>
       </p:transition>
@@ -25003,13 +25003,13 @@
   <p:clrMapOvr>
     <a:masterClrMapping/>
   </p:clrMapOvr>
-  <mc:AlternateContent xmlns:mc="http://schemas.openxmlformats.org/markup-compatibility/2006">
-    <mc:Choice xmlns:p14="http://schemas.microsoft.com/office/powerpoint/2010/main" Requires="p14">
+  <mc:AlternateContent xmlns:mc="http://schemas.openxmlformats.org/markup-compatibility/2006" xmlns:p14="http://schemas.microsoft.com/office/powerpoint/2010/main">
+    <mc:Choice Requires="p14">
       <p:transition spd="slow" p14:dur="2500">
         <p:checker/>
       </p:transition>
     </mc:Choice>
-    <mc:Fallback>
+    <mc:Fallback xmlns="">
       <p:transition spd="slow">
         <p:checker/>
       </p:transition>
@@ -26807,13 +26807,13 @@
   <p:clrMapOvr>
     <a:masterClrMapping/>
   </p:clrMapOvr>
-  <mc:AlternateContent xmlns:mc="http://schemas.openxmlformats.org/markup-compatibility/2006">
-    <mc:Choice xmlns:p14="http://schemas.microsoft.com/office/powerpoint/2010/main" Requires="p14">
+  <mc:AlternateContent xmlns:mc="http://schemas.openxmlformats.org/markup-compatibility/2006" xmlns:p14="http://schemas.microsoft.com/office/powerpoint/2010/main">
+    <mc:Choice Requires="p14">
       <p:transition spd="med" p14:dur="700">
         <p:fade/>
       </p:transition>
     </mc:Choice>
-    <mc:Fallback>
+    <mc:Fallback xmlns="">
       <p:transition spd="med">
         <p:fade/>
       </p:transition>
@@ -28653,13 +28653,13 @@
   <p:clrMapOvr>
     <a:masterClrMapping/>
   </p:clrMapOvr>
-  <mc:AlternateContent xmlns:mc="http://schemas.openxmlformats.org/markup-compatibility/2006">
-    <mc:Choice xmlns:p14="http://schemas.microsoft.com/office/powerpoint/2010/main" Requires="p14">
+  <mc:AlternateContent xmlns:mc="http://schemas.openxmlformats.org/markup-compatibility/2006" xmlns:p14="http://schemas.microsoft.com/office/powerpoint/2010/main">
+    <mc:Choice Requires="p14">
       <p:transition spd="med" p14:dur="700">
         <p:fade/>
       </p:transition>
     </mc:Choice>
-    <mc:Fallback>
+    <mc:Fallback xmlns="">
       <p:transition spd="med">
         <p:fade/>
       </p:transition>
@@ -28892,13 +28892,13 @@
   <p:clrMapOvr>
     <a:masterClrMapping/>
   </p:clrMapOvr>
-  <mc:AlternateContent xmlns:mc="http://schemas.openxmlformats.org/markup-compatibility/2006">
-    <mc:Choice xmlns:p14="http://schemas.microsoft.com/office/powerpoint/2010/main" Requires="p14">
+  <mc:AlternateContent xmlns:mc="http://schemas.openxmlformats.org/markup-compatibility/2006" xmlns:p14="http://schemas.microsoft.com/office/powerpoint/2010/main">
+    <mc:Choice Requires="p14">
       <p:transition spd="slow" p14:dur="4400">
         <p14:honeycomb/>
       </p:transition>
     </mc:Choice>
-    <mc:Fallback>
+    <mc:Fallback xmlns="">
       <p:transition spd="slow">
         <p:fade/>
       </p:transition>
@@ -30341,13 +30341,13 @@
   <p:clrMapOvr>
     <a:masterClrMapping/>
   </p:clrMapOvr>
-  <mc:AlternateContent xmlns:mc="http://schemas.openxmlformats.org/markup-compatibility/2006">
-    <mc:Choice xmlns:p14="http://schemas.microsoft.com/office/powerpoint/2010/main" Requires="p14">
+  <mc:AlternateContent xmlns:mc="http://schemas.openxmlformats.org/markup-compatibility/2006" xmlns:p14="http://schemas.microsoft.com/office/powerpoint/2010/main">
+    <mc:Choice Requires="p14">
       <p:transition spd="slow" p14:dur="2000">
         <p14:ferris dir="l"/>
       </p:transition>
     </mc:Choice>
-    <mc:Fallback>
+    <mc:Fallback xmlns="">
       <p:transition spd="slow">
         <p:fade/>
       </p:transition>
@@ -30549,13 +30549,13 @@
   <p:clrMapOvr>
     <a:masterClrMapping/>
   </p:clrMapOvr>
-  <mc:AlternateContent xmlns:mc="http://schemas.openxmlformats.org/markup-compatibility/2006">
-    <mc:Choice xmlns:p15="http://schemas.microsoft.com/office/powerpoint/2012/main" Requires="p15">
+  <mc:AlternateContent xmlns:mc="http://schemas.openxmlformats.org/markup-compatibility/2006" xmlns:p15="http://schemas.microsoft.com/office/powerpoint/2012/main">
+    <mc:Choice Requires="p15">
       <p:transition xmlns:p14="http://schemas.microsoft.com/office/powerpoint/2010/main" spd="slow" p14:dur="6000">
         <p15:prstTrans prst="curtains"/>
       </p:transition>
     </mc:Choice>
-    <mc:Fallback>
+    <mc:Fallback xmlns="">
       <p:transition spd="slow">
         <p:fade/>
       </p:transition>
@@ -31819,13 +31819,13 @@
   <p:clrMapOvr>
     <a:masterClrMapping/>
   </p:clrMapOvr>
-  <mc:AlternateContent xmlns:mc="http://schemas.openxmlformats.org/markup-compatibility/2006">
-    <mc:Choice xmlns:p14="http://schemas.microsoft.com/office/powerpoint/2010/main" Requires="p14">
+  <mc:AlternateContent xmlns:mc="http://schemas.openxmlformats.org/markup-compatibility/2006" xmlns:p14="http://schemas.microsoft.com/office/powerpoint/2010/main">
+    <mc:Choice Requires="p14">
       <p:transition spd="slow" p14:dur="1200">
         <p:dissolve/>
       </p:transition>
     </mc:Choice>
-    <mc:Fallback>
+    <mc:Fallback xmlns="">
       <p:transition spd="slow">
         <p:dissolve/>
       </p:transition>
@@ -31922,6 +31922,18 @@
   <p:clrMapOvr>
     <a:masterClrMapping/>
   </p:clrMapOvr>
+  <mc:AlternateContent xmlns:mc="http://schemas.openxmlformats.org/markup-compatibility/2006">
+    <mc:Choice xmlns:p15="http://schemas.microsoft.com/office/powerpoint/2012/main" Requires="p15">
+      <p:transition xmlns:p14="http://schemas.microsoft.com/office/powerpoint/2010/main" spd="slow" p14:dur="2000">
+        <p15:prstTrans prst="crush"/>
+      </p:transition>
+    </mc:Choice>
+    <mc:Fallback>
+      <p:transition spd="slow">
+        <p:fade/>
+      </p:transition>
+    </mc:Fallback>
+  </mc:AlternateContent>
 </p:sld>
 </file>
 
@@ -32186,13 +32198,13 @@
   <p:clrMapOvr>
     <a:masterClrMapping/>
   </p:clrMapOvr>
-  <mc:AlternateContent xmlns:mc="http://schemas.openxmlformats.org/markup-compatibility/2006">
-    <mc:Choice xmlns:p14="http://schemas.microsoft.com/office/powerpoint/2010/main" Requires="p14">
+  <mc:AlternateContent xmlns:mc="http://schemas.openxmlformats.org/markup-compatibility/2006" xmlns:p14="http://schemas.microsoft.com/office/powerpoint/2010/main">
+    <mc:Choice Requires="p14">
       <p:transition spd="slow" p14:dur="1600">
         <p14:prism isInverted="1"/>
       </p:transition>
     </mc:Choice>
-    <mc:Fallback>
+    <mc:Fallback xmlns="">
       <p:transition spd="slow">
         <p:fade/>
       </p:transition>
@@ -33180,13 +33192,13 @@
   <p:clrMapOvr>
     <a:masterClrMapping/>
   </p:clrMapOvr>
-  <mc:AlternateContent xmlns:mc="http://schemas.openxmlformats.org/markup-compatibility/2006">
-    <mc:Choice xmlns:p15="http://schemas.microsoft.com/office/powerpoint/2012/main" Requires="p15">
+  <mc:AlternateContent xmlns:mc="http://schemas.openxmlformats.org/markup-compatibility/2006" xmlns:p15="http://schemas.microsoft.com/office/powerpoint/2012/main">
+    <mc:Choice Requires="p15">
       <p:transition xmlns:p14="http://schemas.microsoft.com/office/powerpoint/2010/main" spd="slow" p14:dur="1250">
         <p15:prstTrans prst="pageCurlDouble"/>
       </p:transition>
     </mc:Choice>
-    <mc:Fallback>
+    <mc:Fallback xmlns="">
       <p:transition spd="slow">
         <p:fade/>
       </p:transition>
@@ -35758,13 +35770,13 @@
   <p:clrMapOvr>
     <a:masterClrMapping/>
   </p:clrMapOvr>
-  <mc:AlternateContent xmlns:mc="http://schemas.openxmlformats.org/markup-compatibility/2006">
-    <mc:Choice xmlns:p14="http://schemas.microsoft.com/office/powerpoint/2010/main" Requires="p14">
+  <mc:AlternateContent xmlns:mc="http://schemas.openxmlformats.org/markup-compatibility/2006" xmlns:p14="http://schemas.microsoft.com/office/powerpoint/2010/main">
+    <mc:Choice Requires="p14">
       <p:transition spd="slow" p14:dur="1600">
         <p14:gallery dir="l"/>
       </p:transition>
     </mc:Choice>
-    <mc:Fallback>
+    <mc:Fallback xmlns="">
       <p:transition spd="slow">
         <p:fade/>
       </p:transition>
@@ -40644,13 +40656,13 @@
   <p:clrMapOvr>
     <a:masterClrMapping/>
   </p:clrMapOvr>
-  <mc:AlternateContent xmlns:mc="http://schemas.openxmlformats.org/markup-compatibility/2006">
-    <mc:Choice xmlns:p14="http://schemas.microsoft.com/office/powerpoint/2010/main" Requires="p14">
+  <mc:AlternateContent xmlns:mc="http://schemas.openxmlformats.org/markup-compatibility/2006" xmlns:p14="http://schemas.microsoft.com/office/powerpoint/2010/main">
+    <mc:Choice Requires="p14">
       <p:transition spd="slow" p14:dur="1250">
         <p14:switch dir="r"/>
       </p:transition>
     </mc:Choice>
-    <mc:Fallback>
+    <mc:Fallback xmlns="">
       <p:transition spd="slow">
         <p:fade/>
       </p:transition>

</xml_diff>